<commit_message>
Updating first courses of Semester 5 - Outils Numeriques
</commit_message>
<xml_diff>
--- a/engineer_courses/s5_outils_numeriques/b0_demistifier_python/B0_0_Outils_Methodes.pptx
+++ b/engineer_courses/s5_outils_numeriques/b0_demistifier_python/B0_0_Outils_Methodes.pptx
@@ -9,7 +9,8 @@
     <p:sldId id="257" r:id="rId3"/>
     <p:sldId id="258" r:id="rId4"/>
     <p:sldId id="259" r:id="rId5"/>
-    <p:sldId id="260" r:id="rId6"/>
+    <p:sldId id="261" r:id="rId6"/>
+    <p:sldId id="260" r:id="rId7"/>
   </p:sldIdLst>
   <p:sldSz cx="12192000" cy="6858000"/>
   <p:notesSz cx="6858000" cy="9144000"/>
@@ -272,7 +273,7 @@
           <a:p>
             <a:fld id="{02AC24A9-CCB6-4F8D-B8DB-C2F3692CFA5A}" type="datetimeFigureOut">
               <a:rPr lang="en-US" smtClean="0"/>
-              <a:t>4/8/2023</a:t>
+              <a:t>4/9/2023</a:t>
             </a:fld>
             <a:endParaRPr lang="en-US" dirty="0"/>
           </a:p>
@@ -642,7 +643,7 @@
           <a:p>
             <a:fld id="{02AC24A9-CCB6-4F8D-B8DB-C2F3692CFA5A}" type="datetimeFigureOut">
               <a:rPr lang="en-US" smtClean="0"/>
-              <a:t>4/8/2023</a:t>
+              <a:t>4/9/2023</a:t>
             </a:fld>
             <a:endParaRPr lang="en-US"/>
           </a:p>
@@ -851,7 +852,7 @@
           <a:p>
             <a:fld id="{02AC24A9-CCB6-4F8D-B8DB-C2F3692CFA5A}" type="datetimeFigureOut">
               <a:rPr lang="en-US" smtClean="0"/>
-              <a:t>4/8/2023</a:t>
+              <a:t>4/9/2023</a:t>
             </a:fld>
             <a:endParaRPr lang="en-US"/>
           </a:p>
@@ -1321,7 +1322,7 @@
           <a:p>
             <a:fld id="{02AC24A9-CCB6-4F8D-B8DB-C2F3692CFA5A}" type="datetimeFigureOut">
               <a:rPr lang="en-US" smtClean="0"/>
-              <a:t>4/8/2023</a:t>
+              <a:t>4/9/2023</a:t>
             </a:fld>
             <a:endParaRPr lang="en-US"/>
           </a:p>
@@ -1775,7 +1776,7 @@
           <a:p>
             <a:fld id="{02AC24A9-CCB6-4F8D-B8DB-C2F3692CFA5A}" type="datetimeFigureOut">
               <a:rPr lang="en-US" smtClean="0"/>
-              <a:t>4/8/2023</a:t>
+              <a:t>4/9/2023</a:t>
             </a:fld>
             <a:endParaRPr lang="en-US"/>
           </a:p>
@@ -2307,7 +2308,7 @@
           <a:p>
             <a:fld id="{02AC24A9-CCB6-4F8D-B8DB-C2F3692CFA5A}" type="datetimeFigureOut">
               <a:rPr lang="en-US" smtClean="0"/>
-              <a:t>4/8/2023</a:t>
+              <a:t>4/9/2023</a:t>
             </a:fld>
             <a:endParaRPr lang="en-US"/>
           </a:p>
@@ -3006,7 +3007,7 @@
           <a:p>
             <a:fld id="{02AC24A9-CCB6-4F8D-B8DB-C2F3692CFA5A}" type="datetimeFigureOut">
               <a:rPr lang="en-US" smtClean="0"/>
-              <a:t>4/8/2023</a:t>
+              <a:t>4/9/2023</a:t>
             </a:fld>
             <a:endParaRPr lang="en-US"/>
           </a:p>
@@ -3335,7 +3336,7 @@
           <a:p>
             <a:fld id="{02AC24A9-CCB6-4F8D-B8DB-C2F3692CFA5A}" type="datetimeFigureOut">
               <a:rPr lang="en-US" smtClean="0"/>
-              <a:t>4/8/2023</a:t>
+              <a:t>4/9/2023</a:t>
             </a:fld>
             <a:endParaRPr lang="en-US"/>
           </a:p>
@@ -3448,7 +3449,7 @@
           <a:p>
             <a:fld id="{02AC24A9-CCB6-4F8D-B8DB-C2F3692CFA5A}" type="datetimeFigureOut">
               <a:rPr lang="en-US" smtClean="0"/>
-              <a:t>4/8/2023</a:t>
+              <a:t>4/9/2023</a:t>
             </a:fld>
             <a:endParaRPr lang="en-US"/>
           </a:p>
@@ -3943,7 +3944,7 @@
           <a:p>
             <a:fld id="{02AC24A9-CCB6-4F8D-B8DB-C2F3692CFA5A}" type="datetimeFigureOut">
               <a:rPr lang="en-US" smtClean="0"/>
-              <a:t>4/8/2023</a:t>
+              <a:t>4/9/2023</a:t>
             </a:fld>
             <a:endParaRPr lang="en-US" dirty="0"/>
           </a:p>
@@ -4420,7 +4421,7 @@
           <a:p>
             <a:fld id="{02AC24A9-CCB6-4F8D-B8DB-C2F3692CFA5A}" type="datetimeFigureOut">
               <a:rPr lang="en-US" smtClean="0"/>
-              <a:t>4/8/2023</a:t>
+              <a:t>4/9/2023</a:t>
             </a:fld>
             <a:endParaRPr lang="en-US"/>
           </a:p>
@@ -4663,7 +4664,7 @@
           <a:p>
             <a:fld id="{02AC24A9-CCB6-4F8D-B8DB-C2F3692CFA5A}" type="datetimeFigureOut">
               <a:rPr lang="en-US" smtClean="0"/>
-              <a:t>4/8/2023</a:t>
+              <a:t>4/9/2023</a:t>
             </a:fld>
             <a:endParaRPr lang="en-US"/>
           </a:p>
@@ -5323,7 +5324,7 @@
           <a:p>
             <a:r>
               <a:rPr lang="fr-FR" sz="2000"/>
-              <a:t>Outils Numériques / Semestre 5 / Institut d’Optique</a:t>
+              <a:t>Outils Numériques / Semestre 5 / Institut d’Optique / B0_0</a:t>
             </a:r>
           </a:p>
         </p:txBody>
@@ -6436,6 +6437,248 @@
 </file>
 
 <file path=ppt/slides/slide5.xml><?xml version="1.0" encoding="utf-8"?>
+<p:sld xmlns:a="http://schemas.openxmlformats.org/drawingml/2006/main" xmlns:r="http://schemas.openxmlformats.org/officeDocument/2006/relationships" xmlns:p="http://schemas.openxmlformats.org/presentationml/2006/main">
+  <p:cSld>
+    <p:spTree>
+      <p:nvGrpSpPr>
+        <p:cNvPr id="1" name=""/>
+        <p:cNvGrpSpPr/>
+        <p:nvPr/>
+      </p:nvGrpSpPr>
+      <p:grpSpPr>
+        <a:xfrm>
+          <a:off x="0" y="0"/>
+          <a:ext cx="0" cy="0"/>
+          <a:chOff x="0" y="0"/>
+          <a:chExt cx="0" cy="0"/>
+        </a:xfrm>
+      </p:grpSpPr>
+      <p:sp>
+        <p:nvSpPr>
+          <p:cNvPr id="3" name="Espace réservé du contenu 2">
+            <a:extLst>
+              <a:ext uri="{FF2B5EF4-FFF2-40B4-BE49-F238E27FC236}">
+                <a16:creationId xmlns:a16="http://schemas.microsoft.com/office/drawing/2014/main" id="{E0BBB9DE-019C-C741-F224-494739D4B752}"/>
+              </a:ext>
+            </a:extLst>
+          </p:cNvPr>
+          <p:cNvSpPr>
+            <a:spLocks noGrp="1"/>
+          </p:cNvSpPr>
+          <p:nvPr>
+            <p:ph sz="half" idx="1"/>
+          </p:nvPr>
+        </p:nvSpPr>
+        <p:spPr>
+          <a:xfrm>
+            <a:off x="1115568" y="2478024"/>
+            <a:ext cx="10407838" cy="3694176"/>
+          </a:xfrm>
+        </p:spPr>
+        <p:txBody>
+          <a:bodyPr>
+            <a:normAutofit/>
+          </a:bodyPr>
+          <a:lstStyle/>
+          <a:p>
+            <a:r>
+              <a:rPr lang="fr-FR" sz="2400" dirty="0"/>
+              <a:t>Développement sous </a:t>
+            </a:r>
+            <a:r>
+              <a:rPr lang="fr-FR" sz="2400" b="1" dirty="0"/>
+              <a:t>Python 3.9 </a:t>
+            </a:r>
+            <a:r>
+              <a:rPr lang="fr-FR" sz="2400" dirty="0"/>
+              <a:t>(min) / </a:t>
+            </a:r>
+            <a:r>
+              <a:rPr lang="fr-FR" sz="2400" b="1" dirty="0"/>
+              <a:t>Anaconda 3</a:t>
+            </a:r>
+            <a:r>
+              <a:rPr lang="fr-FR" sz="2400" dirty="0"/>
+              <a:t> / </a:t>
+            </a:r>
+            <a:r>
+              <a:rPr lang="fr-FR" sz="2400" b="1" dirty="0" err="1"/>
+              <a:t>Spyder</a:t>
+            </a:r>
+            <a:r>
+              <a:rPr lang="fr-FR" sz="2400" b="1" dirty="0"/>
+              <a:t> 5</a:t>
+            </a:r>
+          </a:p>
+          <a:p>
+            <a:pPr lvl="1"/>
+            <a:r>
+              <a:rPr lang="fr-FR" dirty="0"/>
+              <a:t>Style de code selon le guide </a:t>
+            </a:r>
+            <a:r>
+              <a:rPr lang="fr-FR" b="1" dirty="0"/>
+              <a:t>PEP 8</a:t>
+            </a:r>
+            <a:r>
+              <a:rPr lang="fr-FR" dirty="0"/>
+              <a:t>  </a:t>
+            </a:r>
+            <a:br>
+              <a:rPr lang="fr-FR" dirty="0"/>
+            </a:br>
+            <a:r>
+              <a:rPr lang="fr-FR" dirty="0"/>
+              <a:t>		https://peps.python.org/pep-0008/</a:t>
+            </a:r>
+          </a:p>
+          <a:p>
+            <a:pPr lvl="1"/>
+            <a:r>
+              <a:rPr lang="fr-FR" dirty="0"/>
+              <a:t>Style de commentaires et de documentation selon le guide </a:t>
+            </a:r>
+            <a:r>
+              <a:rPr lang="fr-FR" b="1" dirty="0"/>
+              <a:t>PEP 257 </a:t>
+            </a:r>
+            <a:br>
+              <a:rPr lang="fr-FR" b="1" dirty="0"/>
+            </a:br>
+            <a:r>
+              <a:rPr lang="fr-FR" b="1" dirty="0"/>
+              <a:t>		</a:t>
+            </a:r>
+            <a:r>
+              <a:rPr lang="fr-FR" dirty="0"/>
+              <a:t>https://peps.python.org/pep-0257/</a:t>
+            </a:r>
+          </a:p>
+          <a:p>
+            <a:r>
+              <a:rPr lang="fr-FR" sz="2400" dirty="0"/>
+              <a:t>Utilisation de bibliothèques standards (</a:t>
+            </a:r>
+            <a:r>
+              <a:rPr lang="fr-FR" sz="2400" dirty="0" err="1"/>
+              <a:t>Numpy</a:t>
+            </a:r>
+            <a:r>
+              <a:rPr lang="fr-FR" sz="2400" dirty="0"/>
+              <a:t>, </a:t>
+            </a:r>
+            <a:r>
+              <a:rPr lang="fr-FR" sz="2400" dirty="0" err="1"/>
+              <a:t>Matplotlib</a:t>
+            </a:r>
+            <a:r>
+              <a:rPr lang="fr-FR" sz="2400" dirty="0"/>
+              <a:t>, </a:t>
+            </a:r>
+            <a:r>
+              <a:rPr lang="fr-FR" sz="2400" dirty="0" err="1"/>
+              <a:t>Scipy</a:t>
+            </a:r>
+            <a:r>
+              <a:rPr lang="fr-FR" sz="2400" dirty="0"/>
+              <a:t>…)</a:t>
+            </a:r>
+          </a:p>
+          <a:p>
+            <a:r>
+              <a:rPr lang="fr-FR" sz="2400" dirty="0"/>
+              <a:t>Découpage en fonctions simples (fichiers .</a:t>
+            </a:r>
+            <a:r>
+              <a:rPr lang="fr-FR" sz="2400" dirty="0" err="1"/>
+              <a:t>py</a:t>
+            </a:r>
+            <a:r>
+              <a:rPr lang="fr-FR" sz="2400" dirty="0"/>
+              <a:t> séparés)</a:t>
+            </a:r>
+            <a:endParaRPr lang="fr-FR" dirty="0"/>
+          </a:p>
+        </p:txBody>
+      </p:sp>
+      <p:sp>
+        <p:nvSpPr>
+          <p:cNvPr id="2" name="Titre 1">
+            <a:extLst>
+              <a:ext uri="{FF2B5EF4-FFF2-40B4-BE49-F238E27FC236}">
+                <a16:creationId xmlns:a16="http://schemas.microsoft.com/office/drawing/2014/main" id="{90162AE8-C1B0-5C56-8313-DEE494F38273}"/>
+              </a:ext>
+            </a:extLst>
+          </p:cNvPr>
+          <p:cNvSpPr>
+            <a:spLocks noGrp="1"/>
+          </p:cNvSpPr>
+          <p:nvPr>
+            <p:ph type="title"/>
+          </p:nvPr>
+        </p:nvSpPr>
+        <p:spPr/>
+        <p:txBody>
+          <a:bodyPr/>
+          <a:lstStyle/>
+          <a:p>
+            <a:r>
+              <a:rPr lang="fr-FR" dirty="0"/>
+              <a:t>Méthode de travail / Bonnes pratiques</a:t>
+            </a:r>
+          </a:p>
+        </p:txBody>
+      </p:sp>
+      <p:pic>
+        <p:nvPicPr>
+          <p:cNvPr id="5" name="Image 4" descr="Une image contenant texte&#10;&#10;Description générée automatiquement">
+            <a:extLst>
+              <a:ext uri="{FF2B5EF4-FFF2-40B4-BE49-F238E27FC236}">
+                <a16:creationId xmlns:a16="http://schemas.microsoft.com/office/drawing/2014/main" id="{204ADC40-1D61-539F-22ED-6B21D67FBDE6}"/>
+              </a:ext>
+            </a:extLst>
+          </p:cNvPr>
+          <p:cNvPicPr>
+            <a:picLocks noChangeAspect="1"/>
+          </p:cNvPicPr>
+          <p:nvPr/>
+        </p:nvPicPr>
+        <p:blipFill>
+          <a:blip r:embed="rId2">
+            <a:extLst>
+              <a:ext uri="{28A0092B-C50C-407E-A947-70E740481C1C}">
+                <a14:useLocalDpi xmlns:a14="http://schemas.microsoft.com/office/drawing/2010/main" val="0"/>
+              </a:ext>
+            </a:extLst>
+          </a:blip>
+          <a:stretch>
+            <a:fillRect/>
+          </a:stretch>
+        </p:blipFill>
+        <p:spPr>
+          <a:xfrm>
+            <a:off x="202922" y="5934456"/>
+            <a:ext cx="1825291" cy="749808"/>
+          </a:xfrm>
+          <a:prstGeom prst="rect">
+            <a:avLst/>
+          </a:prstGeom>
+        </p:spPr>
+      </p:pic>
+    </p:spTree>
+    <p:extLst>
+      <p:ext uri="{BB962C8B-B14F-4D97-AF65-F5344CB8AC3E}">
+        <p14:creationId xmlns:p14="http://schemas.microsoft.com/office/powerpoint/2010/main" val="3230963344"/>
+      </p:ext>
+    </p:extLst>
+  </p:cSld>
+  <p:clrMapOvr>
+    <a:masterClrMapping/>
+  </p:clrMapOvr>
+</p:sld>
+</file>
+
+<file path=ppt/slides/slide6.xml><?xml version="1.0" encoding="utf-8"?>
 <p:sld xmlns:a="http://schemas.openxmlformats.org/drawingml/2006/main" xmlns:r="http://schemas.openxmlformats.org/officeDocument/2006/relationships" xmlns:p="http://schemas.openxmlformats.org/presentationml/2006/main">
   <p:cSld>
     <p:spTree>

</xml_diff>